<commit_message>
Fixed typos in video13-statistical-models.pptz
</commit_message>
<xml_diff>
--- a/clinical-research-methodology/13/results/video13-statistical-models.pptx
+++ b/clinical-research-methodology/13/results/video13-statistical-models.pptx
@@ -325,7 +325,7 @@
           <a:p>
             <a:fld id="{0F9C1CCF-B725-44A7-AA57-5E433BD85C9F}" type="datetimeFigureOut">
               <a:rPr lang="en-US" smtClean="0"/>
-              <a:t>4/17/2024</a:t>
+              <a:t>4/23/2025</a:t>
             </a:fld>
             <a:endParaRPr lang="en-US"/>
           </a:p>
@@ -12233,7 +12233,7 @@
           <a:p>
             <a:fld id="{241EB5C9-1307-BA42-ABA2-0BC069CD8E7F}" type="datetimeFigureOut">
               <a:rPr lang="en-US" smtClean="0"/>
-              <a:t>4/17/2024</a:t>
+              <a:t>4/23/2025</a:t>
             </a:fld>
             <a:endParaRPr lang="en-US"/>
           </a:p>
@@ -12401,7 +12401,7 @@
           <a:p>
             <a:fld id="{241EB5C9-1307-BA42-ABA2-0BC069CD8E7F}" type="datetimeFigureOut">
               <a:rPr lang="en-US" smtClean="0"/>
-              <a:t>4/17/2024</a:t>
+              <a:t>4/23/2025</a:t>
             </a:fld>
             <a:endParaRPr lang="en-US"/>
           </a:p>
@@ -12579,7 +12579,7 @@
           <a:p>
             <a:fld id="{241EB5C9-1307-BA42-ABA2-0BC069CD8E7F}" type="datetimeFigureOut">
               <a:rPr lang="en-US" smtClean="0"/>
-              <a:t>4/17/2024</a:t>
+              <a:t>4/23/2025</a:t>
             </a:fld>
             <a:endParaRPr lang="en-US"/>
           </a:p>
@@ -12747,7 +12747,7 @@
           <a:p>
             <a:fld id="{241EB5C9-1307-BA42-ABA2-0BC069CD8E7F}" type="datetimeFigureOut">
               <a:rPr lang="en-US" smtClean="0"/>
-              <a:t>4/17/2024</a:t>
+              <a:t>4/23/2025</a:t>
             </a:fld>
             <a:endParaRPr lang="en-US"/>
           </a:p>
@@ -12992,7 +12992,7 @@
           <a:p>
             <a:fld id="{241EB5C9-1307-BA42-ABA2-0BC069CD8E7F}" type="datetimeFigureOut">
               <a:rPr lang="en-US" smtClean="0"/>
-              <a:t>4/17/2024</a:t>
+              <a:t>4/23/2025</a:t>
             </a:fld>
             <a:endParaRPr lang="en-US"/>
           </a:p>
@@ -13277,7 +13277,7 @@
           <a:p>
             <a:fld id="{241EB5C9-1307-BA42-ABA2-0BC069CD8E7F}" type="datetimeFigureOut">
               <a:rPr lang="en-US" smtClean="0"/>
-              <a:t>4/17/2024</a:t>
+              <a:t>4/23/2025</a:t>
             </a:fld>
             <a:endParaRPr lang="en-US"/>
           </a:p>
@@ -13696,7 +13696,7 @@
           <a:p>
             <a:fld id="{241EB5C9-1307-BA42-ABA2-0BC069CD8E7F}" type="datetimeFigureOut">
               <a:rPr lang="en-US" smtClean="0"/>
-              <a:t>4/17/2024</a:t>
+              <a:t>4/23/2025</a:t>
             </a:fld>
             <a:endParaRPr lang="en-US"/>
           </a:p>
@@ -13813,7 +13813,7 @@
           <a:p>
             <a:fld id="{241EB5C9-1307-BA42-ABA2-0BC069CD8E7F}" type="datetimeFigureOut">
               <a:rPr lang="en-US" smtClean="0"/>
-              <a:t>4/17/2024</a:t>
+              <a:t>4/23/2025</a:t>
             </a:fld>
             <a:endParaRPr lang="en-US"/>
           </a:p>
@@ -13908,7 +13908,7 @@
           <a:p>
             <a:fld id="{241EB5C9-1307-BA42-ABA2-0BC069CD8E7F}" type="datetimeFigureOut">
               <a:rPr lang="en-US" smtClean="0"/>
-              <a:t>4/17/2024</a:t>
+              <a:t>4/23/2025</a:t>
             </a:fld>
             <a:endParaRPr lang="en-US"/>
           </a:p>
@@ -14183,7 +14183,7 @@
           <a:p>
             <a:fld id="{241EB5C9-1307-BA42-ABA2-0BC069CD8E7F}" type="datetimeFigureOut">
               <a:rPr lang="en-US" smtClean="0"/>
-              <a:t>4/17/2024</a:t>
+              <a:t>4/23/2025</a:t>
             </a:fld>
             <a:endParaRPr lang="en-US"/>
           </a:p>
@@ -14435,7 +14435,7 @@
           <a:p>
             <a:fld id="{241EB5C9-1307-BA42-ABA2-0BC069CD8E7F}" type="datetimeFigureOut">
               <a:rPr lang="en-US" smtClean="0"/>
-              <a:t>4/17/2024</a:t>
+              <a:t>4/23/2025</a:t>
             </a:fld>
             <a:endParaRPr lang="en-US"/>
           </a:p>
@@ -14646,7 +14646,7 @@
           <a:p>
             <a:fld id="{241EB5C9-1307-BA42-ABA2-0BC069CD8E7F}" type="datetimeFigureOut">
               <a:rPr lang="en-US" smtClean="0"/>
-              <a:t>4/17/2024</a:t>
+              <a:t>4/23/2025</a:t>
             </a:fld>
             <a:endParaRPr lang="en-US"/>
           </a:p>
@@ -15147,24 +15147,36 @@
           <a:p>
             <a:pPr lvl="1"/>
             <a:r>
+              <a:rPr dirty="0"/>
               <a:t>Check composite scores</a:t>
             </a:r>
           </a:p>
           <a:p>
             <a:pPr lvl="2"/>
             <a:r>
-              <a:t>Check Cronbach’s alpha</a:t>
+              <a:rPr dirty="0"/>
+              <a:t>C</a:t>
+            </a:r>
+            <a:r>
+              <a:rPr lang="en-US" dirty="0"/>
+              <a:t>ompute</a:t>
+            </a:r>
+            <a:r>
+              <a:rPr dirty="0"/>
+              <a:t> Cronbach’s alpha</a:t>
             </a:r>
           </a:p>
           <a:p>
             <a:pPr lvl="2"/>
             <a:r>
+              <a:rPr dirty="0"/>
               <a:t>Examine leaving out single items</a:t>
             </a:r>
           </a:p>
           <a:p>
             <a:pPr lvl="2"/>
             <a:r>
+              <a:rPr dirty="0"/>
               <a:t>Factor analysis, Structural Equations Modeling</a:t>
             </a:r>
           </a:p>
@@ -21108,48 +21120,72 @@
           <a:p>
             <a:pPr lvl="1"/>
             <a:r>
+              <a:rPr dirty="0"/>
               <a:t>Special cases</a:t>
             </a:r>
           </a:p>
           <a:p>
             <a:pPr lvl="2"/>
             <a:r>
+              <a:rPr dirty="0"/>
               <a:t>Binary: Logistic regression</a:t>
             </a:r>
           </a:p>
           <a:p>
             <a:pPr lvl="2"/>
             <a:r>
+              <a:rPr dirty="0"/>
               <a:t>Counts: Poisson regression</a:t>
             </a:r>
           </a:p>
           <a:p>
             <a:pPr lvl="2"/>
             <a:r>
+              <a:rPr dirty="0"/>
               <a:t>Time-to-event data: Cox proportional hazards regression</a:t>
             </a:r>
           </a:p>
           <a:p>
             <a:pPr lvl="1"/>
             <a:r>
+              <a:rPr dirty="0"/>
               <a:t>Nominal: Chi-square tests, multinomial logistic regression</a:t>
             </a:r>
           </a:p>
           <a:p>
             <a:pPr lvl="1"/>
             <a:r>
+              <a:rPr dirty="0"/>
               <a:t>Ordinal outcome variable: Non-parametric tests, ordinal logistic regression</a:t>
             </a:r>
           </a:p>
           <a:p>
             <a:pPr lvl="1"/>
             <a:r>
-              <a:t>Ordinal indepdent variable” p for trend tests</a:t>
+              <a:rPr dirty="0"/>
+              <a:t>Ordinal indep</a:t>
+            </a:r>
+            <a:r>
+              <a:rPr lang="en-US" dirty="0"/>
+              <a:t>en</a:t>
+            </a:r>
+            <a:r>
+              <a:rPr dirty="0"/>
+              <a:t>dent variable</a:t>
+            </a:r>
+            <a:r>
+              <a:rPr lang="en-US" dirty="0"/>
+              <a:t>:</a:t>
+            </a:r>
+            <a:r>
+              <a:rPr dirty="0"/>
+              <a:t> p for trend tests</a:t>
             </a:r>
           </a:p>
           <a:p>
             <a:pPr lvl="1"/>
             <a:r>
+              <a:rPr dirty="0"/>
               <a:t>Interval/ratio: t-tests, analysis of variance, linear regression</a:t>
             </a:r>
           </a:p>
@@ -21295,72 +21331,93 @@
         </p:nvSpPr>
         <p:spPr/>
         <p:txBody>
-          <a:bodyPr/>
+          <a:bodyPr>
+            <a:normAutofit fontScale="92500" lnSpcReduction="10000"/>
+          </a:bodyPr>
           <a:lstStyle/>
           <a:p>
             <a:pPr lvl="1"/>
             <a:r>
+              <a:rPr dirty="0"/>
               <a:t>t-test (two sample t-test)</a:t>
             </a:r>
           </a:p>
           <a:p>
             <a:pPr lvl="2"/>
             <a:r>
+              <a:rPr dirty="0"/>
               <a:t>Continuous outcome</a:t>
             </a:r>
           </a:p>
           <a:p>
             <a:pPr lvl="2"/>
             <a:r>
-              <a:t>Catregorical independent variable with two levels</a:t>
+              <a:rPr dirty="0"/>
+              <a:t>Categorical independent variable with two levels</a:t>
             </a:r>
           </a:p>
           <a:p>
             <a:pPr lvl="1"/>
             <a:r>
+              <a:rPr dirty="0"/>
               <a:t>Disadvantages of the t-test</a:t>
             </a:r>
           </a:p>
           <a:p>
             <a:pPr lvl="2"/>
             <a:r>
+              <a:rPr dirty="0"/>
               <a:t>No risk adjustment or interactions</a:t>
             </a:r>
           </a:p>
           <a:p>
             <a:pPr lvl="1"/>
             <a:r>
+              <a:rPr dirty="0"/>
               <a:t>Analysis of variance</a:t>
             </a:r>
           </a:p>
           <a:p>
             <a:pPr lvl="2"/>
             <a:r>
+              <a:rPr dirty="0"/>
               <a:t>Continuous outcome</a:t>
             </a:r>
           </a:p>
           <a:p>
             <a:pPr lvl="2"/>
             <a:r>
+              <a:rPr dirty="0"/>
               <a:t>Categorical independent variable with three or more levels</a:t>
             </a:r>
           </a:p>
           <a:p>
             <a:pPr lvl="2"/>
             <a:r>
+              <a:rPr dirty="0"/>
               <a:t>Can use more than one categorical independent variable</a:t>
             </a:r>
           </a:p>
           <a:p>
             <a:pPr lvl="1"/>
             <a:r>
+              <a:rPr dirty="0"/>
               <a:t>Analysis of covariance</a:t>
             </a:r>
           </a:p>
           <a:p>
             <a:pPr lvl="2"/>
             <a:r>
-              <a:t>Second indepdent variable is continuous</a:t>
+              <a:rPr dirty="0"/>
+              <a:t>Second indep</a:t>
+            </a:r>
+            <a:r>
+              <a:rPr lang="en-US" dirty="0"/>
+              <a:t>en</a:t>
+            </a:r>
+            <a:r>
+              <a:rPr dirty="0"/>
+              <a:t>dent variable is continuous</a:t>
             </a:r>
           </a:p>
         </p:txBody>

</xml_diff>